<commit_message>
added links to Bayesian statistics book
</commit_message>
<xml_diff>
--- a/PythonML2023_Lecture3.pptx
+++ b/PythonML2023_Lecture3.pptx
@@ -210,7 +210,7 @@
           <a:p>
             <a:fld id="{DE95C9EB-832B-432C-90C7-6D55FBA90028}" type="datetimeFigureOut">
               <a:rPr lang="en-US" smtClean="0"/>
-              <a:t>3/2/2023</a:t>
+              <a:t>4/14/2023</a:t>
             </a:fld>
             <a:endParaRPr lang="en-US"/>
           </a:p>
@@ -1449,7 +1449,7 @@
             <a:fld id="{B61BEF0D-F0BB-DE4B-95CE-6DB70DBA9567}" type="datetimeFigureOut">
               <a:rPr lang="en-US" smtClean="0"/>
               <a:pPr/>
-              <a:t>3/2/2023</a:t>
+              <a:t>4/14/2023</a:t>
             </a:fld>
             <a:endParaRPr lang="en-US" dirty="0"/>
           </a:p>
@@ -1621,7 +1621,7 @@
             <a:fld id="{B61BEF0D-F0BB-DE4B-95CE-6DB70DBA9567}" type="datetimeFigureOut">
               <a:rPr lang="en-US" smtClean="0"/>
               <a:pPr/>
-              <a:t>3/2/2023</a:t>
+              <a:t>4/14/2023</a:t>
             </a:fld>
             <a:endParaRPr lang="en-US" dirty="0"/>
           </a:p>
@@ -1803,7 +1803,7 @@
             <a:fld id="{B61BEF0D-F0BB-DE4B-95CE-6DB70DBA9567}" type="datetimeFigureOut">
               <a:rPr lang="en-US" smtClean="0"/>
               <a:pPr/>
-              <a:t>3/2/2023</a:t>
+              <a:t>4/14/2023</a:t>
             </a:fld>
             <a:endParaRPr lang="en-US" dirty="0"/>
           </a:p>
@@ -1975,7 +1975,7 @@
             <a:fld id="{B61BEF0D-F0BB-DE4B-95CE-6DB70DBA9567}" type="datetimeFigureOut">
               <a:rPr lang="en-US" smtClean="0"/>
               <a:pPr/>
-              <a:t>3/2/2023</a:t>
+              <a:t>4/14/2023</a:t>
             </a:fld>
             <a:endParaRPr lang="en-US" dirty="0"/>
           </a:p>
@@ -2223,7 +2223,7 @@
             <a:fld id="{B61BEF0D-F0BB-DE4B-95CE-6DB70DBA9567}" type="datetimeFigureOut">
               <a:rPr lang="en-US" smtClean="0"/>
               <a:pPr/>
-              <a:t>3/2/2023</a:t>
+              <a:t>4/14/2023</a:t>
             </a:fld>
             <a:endParaRPr lang="en-US" dirty="0"/>
           </a:p>
@@ -2457,7 +2457,7 @@
             <a:fld id="{B61BEF0D-F0BB-DE4B-95CE-6DB70DBA9567}" type="datetimeFigureOut">
               <a:rPr lang="en-US" smtClean="0"/>
               <a:pPr/>
-              <a:t>3/2/2023</a:t>
+              <a:t>4/14/2023</a:t>
             </a:fld>
             <a:endParaRPr lang="en-US" dirty="0"/>
           </a:p>
@@ -2826,7 +2826,7 @@
             <a:fld id="{B61BEF0D-F0BB-DE4B-95CE-6DB70DBA9567}" type="datetimeFigureOut">
               <a:rPr lang="en-US" smtClean="0"/>
               <a:pPr/>
-              <a:t>3/2/2023</a:t>
+              <a:t>4/14/2023</a:t>
             </a:fld>
             <a:endParaRPr lang="en-US" dirty="0"/>
           </a:p>
@@ -2946,7 +2946,7 @@
             <a:fld id="{B61BEF0D-F0BB-DE4B-95CE-6DB70DBA9567}" type="datetimeFigureOut">
               <a:rPr lang="en-US" smtClean="0"/>
               <a:pPr/>
-              <a:t>3/2/2023</a:t>
+              <a:t>4/14/2023</a:t>
             </a:fld>
             <a:endParaRPr lang="en-US" dirty="0"/>
           </a:p>
@@ -3043,7 +3043,7 @@
             <a:fld id="{B61BEF0D-F0BB-DE4B-95CE-6DB70DBA9567}" type="datetimeFigureOut">
               <a:rPr lang="en-US" smtClean="0"/>
               <a:pPr/>
-              <a:t>3/2/2023</a:t>
+              <a:t>4/14/2023</a:t>
             </a:fld>
             <a:endParaRPr lang="en-US" dirty="0"/>
           </a:p>
@@ -3322,7 +3322,7 @@
             <a:fld id="{B61BEF0D-F0BB-DE4B-95CE-6DB70DBA9567}" type="datetimeFigureOut">
               <a:rPr lang="en-US" smtClean="0"/>
               <a:pPr/>
-              <a:t>3/2/2023</a:t>
+              <a:t>4/14/2023</a:t>
             </a:fld>
             <a:endParaRPr lang="en-US" dirty="0"/>
           </a:p>
@@ -3581,7 +3581,7 @@
             <a:fld id="{B61BEF0D-F0BB-DE4B-95CE-6DB70DBA9567}" type="datetimeFigureOut">
               <a:rPr lang="en-US" smtClean="0"/>
               <a:pPr/>
-              <a:t>3/2/2023</a:t>
+              <a:t>4/14/2023</a:t>
             </a:fld>
             <a:endParaRPr lang="en-US" dirty="0"/>
           </a:p>
@@ -3796,7 +3796,7 @@
             <a:fld id="{B61BEF0D-F0BB-DE4B-95CE-6DB70DBA9567}" type="datetimeFigureOut">
               <a:rPr lang="en-US" smtClean="0"/>
               <a:pPr/>
-              <a:t>3/2/2023</a:t>
+              <a:t>4/14/2023</a:t>
             </a:fld>
             <a:endParaRPr lang="en-US" dirty="0"/>
           </a:p>
@@ -9511,7 +9511,7 @@
         <p:spPr>
           <a:xfrm>
             <a:off x="359923" y="979948"/>
-            <a:ext cx="11358182" cy="6801862"/>
+            <a:ext cx="11358182" cy="8032968"/>
           </a:xfrm>
           <a:prstGeom prst="rect">
             <a:avLst/>
@@ -9636,10 +9636,47 @@
           <a:p>
             <a:r>
               <a:rPr lang="pt-BR" sz="1600" dirty="0"/>
-              <a:t>                                                   </a:t>
+              <a:t>           </a:t>
             </a:r>
           </a:p>
           <a:p>
+            <a:endParaRPr lang="pt-BR" sz="1600" dirty="0"/>
+          </a:p>
+          <a:p>
+            <a:endParaRPr lang="pt-BR" sz="1600"/>
+          </a:p>
+          <a:p>
+            <a:r>
+              <a:rPr lang="pt-BR" sz="1600"/>
+              <a:t>                                        </a:t>
+            </a:r>
+            <a:endParaRPr lang="pt-BR" sz="1600" dirty="0"/>
+          </a:p>
+          <a:p>
+            <a:r>
+              <a:rPr lang="pt-BR" sz="1600" dirty="0"/>
+              <a:t>Good reading ob Baesian statistics! :</a:t>
+            </a:r>
+          </a:p>
+          <a:p>
+            <a:r>
+              <a:rPr lang="en-US" sz="1600" dirty="0">
+                <a:hlinkClick r:id="rId3"/>
+              </a:rPr>
+              <a:t>Probabilistic-Programming-and-Bayesian-Methods-for-Hackers/Ch1_Introduction_PyMC_current.ipynb at master · </a:t>
+            </a:r>
+            <a:r>
+              <a:rPr lang="en-US" sz="1600" dirty="0" err="1">
+                <a:hlinkClick r:id="rId3"/>
+              </a:rPr>
+              <a:t>CamDavidsonPilon</a:t>
+            </a:r>
+            <a:r>
+              <a:rPr lang="en-US" sz="1600" dirty="0">
+                <a:hlinkClick r:id="rId3"/>
+              </a:rPr>
+              <a:t>/Probabilistic-Programming-and-Bayesian-Methods-for-Hackers (github.com)</a:t>
+            </a:r>
             <a:endParaRPr lang="pt-BR" sz="1600" dirty="0"/>
           </a:p>
           <a:p>
@@ -9748,7 +9785,7 @@
           <p:nvPr/>
         </p:nvPicPr>
         <p:blipFill>
-          <a:blip r:embed="rId3"/>
+          <a:blip r:embed="rId4"/>
           <a:stretch>
             <a:fillRect/>
           </a:stretch>
@@ -9913,34 +9950,13 @@
               <a:t>from our previous exercise :</a:t>
             </a:r>
             <a:r>
-              <a:rPr lang="en-US" sz="1800" dirty="0" err="1">
-                <a:solidFill>
-                  <a:srgbClr val="555555"/>
-                </a:solidFill>
-                <a:effectLst/>
-                <a:latin typeface="Calibri" panose="020F0502020204030204" pitchFamily="34" charset="0"/>
-                <a:ea typeface="Times New Roman" panose="02020603050405020304" pitchFamily="18" charset="0"/>
-                <a:cs typeface="Times New Roman" panose="02020603050405020304" pitchFamily="18" charset="0"/>
-              </a:rPr>
-              <a:t>bb</a:t>
-            </a:r>
-            <a:r>
-              <a:rPr lang="en-US" sz="1800" i="1" dirty="0" err="1">
-                <a:effectLst/>
-                <a:latin typeface="Calibri" panose="020F0502020204030204" pitchFamily="34" charset="0"/>
-                <a:ea typeface="Times New Roman" panose="02020603050405020304" pitchFamily="18" charset="0"/>
-                <a:cs typeface="Times New Roman" panose="02020603050405020304" pitchFamily="18" charset="0"/>
-              </a:rPr>
-              <a:t>P</a:t>
-            </a:r>
-            <a:r>
               <a:rPr lang="en-US" sz="1800" i="1" dirty="0">
                 <a:effectLst/>
                 <a:latin typeface="Calibri" panose="020F0502020204030204" pitchFamily="34" charset="0"/>
                 <a:ea typeface="Times New Roman" panose="02020603050405020304" pitchFamily="18" charset="0"/>
                 <a:cs typeface="Times New Roman" panose="02020603050405020304" pitchFamily="18" charset="0"/>
               </a:rPr>
-              <a:t>(GS|S) = 0.64  a</a:t>
+              <a:t>P(GS|S) = 0.64  a</a:t>
             </a:r>
             <a:r>
               <a:rPr lang="en-US" sz="1800" dirty="0">

</xml_diff>